<commit_message>
Updated project and syllabus
New syllabus policies significant change in Project
</commit_message>
<xml_diff>
--- a/CSC3510 S2021/Lectures/01IntroductionTo3510.pptx
+++ b/CSC3510 S2021/Lectures/01IntroductionTo3510.pptx
@@ -1026,7 +1026,7 @@
           <a:p>
             <a:fld id="{C8AEADBA-F76D-42CB-AAEA-5899A162C59D}" type="datetimeFigureOut">
               <a:rPr lang="en-US" smtClean="0"/>
-              <a:t>1/7/2021</a:t>
+              <a:t>1/8/2021</a:t>
             </a:fld>
             <a:endParaRPr lang="en-US"/>
           </a:p>
@@ -1512,7 +1512,7 @@
           <a:p>
             <a:fld id="{83777DF0-4DA5-40CD-8FA1-5F589D66E613}" type="datetimeFigureOut">
               <a:rPr lang="en-US" smtClean="0"/>
-              <a:t>1/7/2021</a:t>
+              <a:t>1/8/2021</a:t>
             </a:fld>
             <a:endParaRPr lang="en-US"/>
           </a:p>
@@ -1682,7 +1682,7 @@
           <a:p>
             <a:fld id="{83777DF0-4DA5-40CD-8FA1-5F589D66E613}" type="datetimeFigureOut">
               <a:rPr lang="en-US" smtClean="0"/>
-              <a:t>1/7/2021</a:t>
+              <a:t>1/8/2021</a:t>
             </a:fld>
             <a:endParaRPr lang="en-US"/>
           </a:p>
@@ -1862,7 +1862,7 @@
           <a:p>
             <a:fld id="{83777DF0-4DA5-40CD-8FA1-5F589D66E613}" type="datetimeFigureOut">
               <a:rPr lang="en-US" smtClean="0"/>
-              <a:t>1/7/2021</a:t>
+              <a:t>1/8/2021</a:t>
             </a:fld>
             <a:endParaRPr lang="en-US"/>
           </a:p>
@@ -2032,7 +2032,7 @@
           <a:p>
             <a:fld id="{83777DF0-4DA5-40CD-8FA1-5F589D66E613}" type="datetimeFigureOut">
               <a:rPr lang="en-US" smtClean="0"/>
-              <a:t>1/7/2021</a:t>
+              <a:t>1/8/2021</a:t>
             </a:fld>
             <a:endParaRPr lang="en-US"/>
           </a:p>
@@ -2278,7 +2278,7 @@
           <a:p>
             <a:fld id="{83777DF0-4DA5-40CD-8FA1-5F589D66E613}" type="datetimeFigureOut">
               <a:rPr lang="en-US" smtClean="0"/>
-              <a:t>1/7/2021</a:t>
+              <a:t>1/8/2021</a:t>
             </a:fld>
             <a:endParaRPr lang="en-US"/>
           </a:p>
@@ -2510,7 +2510,7 @@
           <a:p>
             <a:fld id="{83777DF0-4DA5-40CD-8FA1-5F589D66E613}" type="datetimeFigureOut">
               <a:rPr lang="en-US" smtClean="0"/>
-              <a:t>1/7/2021</a:t>
+              <a:t>1/8/2021</a:t>
             </a:fld>
             <a:endParaRPr lang="en-US"/>
           </a:p>
@@ -2877,7 +2877,7 @@
           <a:p>
             <a:fld id="{83777DF0-4DA5-40CD-8FA1-5F589D66E613}" type="datetimeFigureOut">
               <a:rPr lang="en-US" smtClean="0"/>
-              <a:t>1/7/2021</a:t>
+              <a:t>1/8/2021</a:t>
             </a:fld>
             <a:endParaRPr lang="en-US"/>
           </a:p>
@@ -2995,7 +2995,7 @@
           <a:p>
             <a:fld id="{83777DF0-4DA5-40CD-8FA1-5F589D66E613}" type="datetimeFigureOut">
               <a:rPr lang="en-US" smtClean="0"/>
-              <a:t>1/7/2021</a:t>
+              <a:t>1/8/2021</a:t>
             </a:fld>
             <a:endParaRPr lang="en-US"/>
           </a:p>
@@ -3090,7 +3090,7 @@
           <a:p>
             <a:fld id="{83777DF0-4DA5-40CD-8FA1-5F589D66E613}" type="datetimeFigureOut">
               <a:rPr lang="en-US" smtClean="0"/>
-              <a:t>1/7/2021</a:t>
+              <a:t>1/8/2021</a:t>
             </a:fld>
             <a:endParaRPr lang="en-US"/>
           </a:p>
@@ -3367,7 +3367,7 @@
           <a:p>
             <a:fld id="{83777DF0-4DA5-40CD-8FA1-5F589D66E613}" type="datetimeFigureOut">
               <a:rPr lang="en-US" smtClean="0"/>
-              <a:t>1/7/2021</a:t>
+              <a:t>1/8/2021</a:t>
             </a:fld>
             <a:endParaRPr lang="en-US"/>
           </a:p>
@@ -3624,7 +3624,7 @@
           <a:p>
             <a:fld id="{83777DF0-4DA5-40CD-8FA1-5F589D66E613}" type="datetimeFigureOut">
               <a:rPr lang="en-US" smtClean="0"/>
-              <a:t>1/7/2021</a:t>
+              <a:t>1/8/2021</a:t>
             </a:fld>
             <a:endParaRPr lang="en-US"/>
           </a:p>
@@ -3844,7 +3844,7 @@
           <a:p>
             <a:fld id="{83777DF0-4DA5-40CD-8FA1-5F589D66E613}" type="datetimeFigureOut">
               <a:rPr lang="en-US" smtClean="0"/>
-              <a:t>1/7/2021</a:t>
+              <a:t>1/8/2021</a:t>
             </a:fld>
             <a:endParaRPr lang="en-US"/>
           </a:p>
@@ -10230,7 +10230,7 @@
         <p:spPr>
           <a:xfrm>
             <a:off x="2823180" y="2980638"/>
-            <a:ext cx="2790251" cy="369332"/>
+            <a:ext cx="4406399" cy="369332"/>
           </a:xfrm>
           <a:prstGeom prst="rect">
             <a:avLst/>
@@ -10245,15 +10245,7 @@
           <a:p>
             <a:r>
               <a:rPr lang="en-US" dirty="0"/>
-              <a:t>IDE’s IntelliJ, IDE </a:t>
-            </a:r>
-            <a:r>
-              <a:rPr lang="en-US" dirty="0" err="1"/>
-              <a:t>Webstorm</a:t>
-            </a:r>
-            <a:r>
-              <a:rPr lang="en-US" dirty="0"/>
-              <a:t> </a:t>
+              <a:t>IDE’s IntelliJ, IDE WebStorm, GitHub Desktop </a:t>
             </a:r>
           </a:p>
         </p:txBody>
@@ -11630,470 +11622,12 @@
           <a:chExt cx="0" cy="0"/>
         </a:xfrm>
       </p:grpSpPr>
-      <p:graphicFrame>
-        <p:nvGraphicFramePr>
-          <p:cNvPr id="4" name="Content Placeholder 3">
+      <p:pic>
+        <p:nvPicPr>
+          <p:cNvPr id="17" name="Picture 16">
             <a:extLst>
               <a:ext uri="{FF2B5EF4-FFF2-40B4-BE49-F238E27FC236}">
-                <a16:creationId xmlns:a16="http://schemas.microsoft.com/office/drawing/2014/main" id="{33B20147-5D86-4990-A5B0-2015449C95B3}"/>
-              </a:ext>
-            </a:extLst>
-          </p:cNvPr>
-          <p:cNvGraphicFramePr>
-            <a:graphicFrameLocks noGrp="1"/>
-          </p:cNvGraphicFramePr>
-          <p:nvPr>
-            <p:ph idx="1"/>
-            <p:extLst>
-              <p:ext uri="{D42A27DB-BD31-4B8C-83A1-F6EECF244321}">
-                <p14:modId xmlns:p14="http://schemas.microsoft.com/office/powerpoint/2010/main" val="1546735464"/>
-              </p:ext>
-            </p:extLst>
-          </p:nvPr>
-        </p:nvGraphicFramePr>
-        <p:xfrm>
-          <a:off x="2938509" y="2201662"/>
-          <a:ext cx="4770391" cy="2813088"/>
-        </p:xfrm>
-        <a:graphic>
-          <a:graphicData uri="http://schemas.openxmlformats.org/drawingml/2006/table">
-            <a:tbl>
-              <a:tblPr>
-                <a:tableStyleId>{5C22544A-7EE6-4342-B048-85BDC9FD1C3A}</a:tableStyleId>
-              </a:tblPr>
-              <a:tblGrid>
-                <a:gridCol w="4770391">
-                  <a:extLst>
-                    <a:ext uri="{9D8B030D-6E8A-4147-A177-3AD203B41FA5}">
-                      <a16:colId xmlns:a16="http://schemas.microsoft.com/office/drawing/2014/main" val="395453339"/>
-                    </a:ext>
-                  </a:extLst>
-                </a:gridCol>
-              </a:tblGrid>
-              <a:tr h="285539">
-                <a:tc>
-                  <a:txBody>
-                    <a:bodyPr/>
-                    <a:lstStyle/>
-                    <a:p>
-                      <a:pPr algn="l" fontAlgn="ctr"/>
-                      <a:r>
-                        <a:rPr lang="en-US" sz="1100" u="none" strike="noStrike">
-                          <a:effectLst/>
-                        </a:rPr>
-                        <a:t>Topics Covered in the Course</a:t>
-                      </a:r>
-                      <a:endParaRPr lang="en-US" sz="1100" b="1" i="0" u="none" strike="noStrike">
-                        <a:solidFill>
-                          <a:srgbClr val="000000"/>
-                        </a:solidFill>
-                        <a:effectLst/>
-                        <a:latin typeface="Calibri" panose="020F0502020204030204" pitchFamily="34" charset="0"/>
-                      </a:endParaRPr>
-                    </a:p>
-                  </a:txBody>
-                  <a:tcPr marL="7620" marR="7620" marT="7620" marB="0" anchor="ctr"/>
-                </a:tc>
-                <a:extLst>
-                  <a:ext uri="{0D108BD9-81ED-4DB2-BD59-A6C34878D82A}">
-                    <a16:rowId xmlns:a16="http://schemas.microsoft.com/office/drawing/2014/main" val="820915461"/>
-                  </a:ext>
-                </a:extLst>
-              </a:tr>
-              <a:tr h="285539">
-                <a:tc>
-                  <a:txBody>
-                    <a:bodyPr/>
-                    <a:lstStyle/>
-                    <a:p>
-                      <a:pPr algn="l" fontAlgn="ctr"/>
-                      <a:r>
-                        <a:rPr lang="en-US" sz="1000" u="none" strike="noStrike">
-                          <a:effectLst/>
-                        </a:rPr>
-                        <a:t>·</a:t>
-                      </a:r>
-                      <a:r>
-                        <a:rPr lang="en-US" sz="700" u="none" strike="noStrike">
-                          <a:effectLst/>
-                        </a:rPr>
-                        <a:t>        </a:t>
-                      </a:r>
-                      <a:r>
-                        <a:rPr lang="en-US" sz="1000" u="none" strike="noStrike">
-                          <a:effectLst/>
-                        </a:rPr>
-                        <a:t>Testing Concepts</a:t>
-                      </a:r>
-                      <a:endParaRPr lang="en-US" sz="1000" b="0" i="0" u="none" strike="noStrike">
-                        <a:solidFill>
-                          <a:srgbClr val="000000"/>
-                        </a:solidFill>
-                        <a:effectLst/>
-                        <a:latin typeface="Symbol" panose="05050102010706020507" pitchFamily="18" charset="2"/>
-                      </a:endParaRPr>
-                    </a:p>
-                  </a:txBody>
-                  <a:tcPr marL="182880" marR="7620" marT="7620" marB="0" anchor="ctr"/>
-                </a:tc>
-                <a:extLst>
-                  <a:ext uri="{0D108BD9-81ED-4DB2-BD59-A6C34878D82A}">
-                    <a16:rowId xmlns:a16="http://schemas.microsoft.com/office/drawing/2014/main" val="1968400483"/>
-                  </a:ext>
-                </a:extLst>
-              </a:tr>
-              <a:tr h="285539">
-                <a:tc>
-                  <a:txBody>
-                    <a:bodyPr/>
-                    <a:lstStyle/>
-                    <a:p>
-                      <a:pPr algn="l" fontAlgn="ctr"/>
-                      <a:r>
-                        <a:rPr lang="nl-NL" sz="1000" u="none" strike="noStrike" dirty="0">
-                          <a:effectLst/>
-                        </a:rPr>
-                        <a:t>·</a:t>
-                      </a:r>
-                      <a:r>
-                        <a:rPr lang="nl-NL" sz="700" u="none" strike="noStrike" dirty="0">
-                          <a:effectLst/>
-                        </a:rPr>
-                        <a:t>        </a:t>
-                      </a:r>
-                      <a:r>
-                        <a:rPr lang="nl-NL" sz="1000" u="none" strike="noStrike" dirty="0">
-                          <a:effectLst/>
-                        </a:rPr>
-                        <a:t>Agile EP testing roots (1)</a:t>
-                      </a:r>
-                      <a:endParaRPr lang="nl-NL" sz="1000" b="0" i="0" u="none" strike="noStrike" dirty="0">
-                        <a:solidFill>
-                          <a:srgbClr val="000000"/>
-                        </a:solidFill>
-                        <a:effectLst/>
-                        <a:latin typeface="Symbol" panose="05050102010706020507" pitchFamily="18" charset="2"/>
-                      </a:endParaRPr>
-                    </a:p>
-                  </a:txBody>
-                  <a:tcPr marL="182880" marR="7620" marT="7620" marB="0" anchor="ctr"/>
-                </a:tc>
-                <a:extLst>
-                  <a:ext uri="{0D108BD9-81ED-4DB2-BD59-A6C34878D82A}">
-                    <a16:rowId xmlns:a16="http://schemas.microsoft.com/office/drawing/2014/main" val="3596880673"/>
-                  </a:ext>
-                </a:extLst>
-              </a:tr>
-              <a:tr h="285539">
-                <a:tc>
-                  <a:txBody>
-                    <a:bodyPr/>
-                    <a:lstStyle/>
-                    <a:p>
-                      <a:pPr algn="l" fontAlgn="ctr"/>
-                      <a:r>
-                        <a:rPr lang="en-US" sz="1000" u="none" strike="noStrike">
-                          <a:effectLst/>
-                        </a:rPr>
-                        <a:t>·</a:t>
-                      </a:r>
-                      <a:r>
-                        <a:rPr lang="en-US" sz="700" u="none" strike="noStrike">
-                          <a:effectLst/>
-                        </a:rPr>
-                        <a:t>        </a:t>
-                      </a:r>
-                      <a:r>
-                        <a:rPr lang="en-US" sz="1000" u="none" strike="noStrike">
-                          <a:effectLst/>
-                        </a:rPr>
-                        <a:t>Code Reviews</a:t>
-                      </a:r>
-                      <a:endParaRPr lang="en-US" sz="1000" b="0" i="0" u="none" strike="noStrike">
-                        <a:solidFill>
-                          <a:srgbClr val="000000"/>
-                        </a:solidFill>
-                        <a:effectLst/>
-                        <a:latin typeface="Symbol" panose="05050102010706020507" pitchFamily="18" charset="2"/>
-                      </a:endParaRPr>
-                    </a:p>
-                  </a:txBody>
-                  <a:tcPr marL="182880" marR="7620" marT="7620" marB="0" anchor="ctr"/>
-                </a:tc>
-                <a:extLst>
-                  <a:ext uri="{0D108BD9-81ED-4DB2-BD59-A6C34878D82A}">
-                    <a16:rowId xmlns:a16="http://schemas.microsoft.com/office/drawing/2014/main" val="1493921477"/>
-                  </a:ext>
-                </a:extLst>
-              </a:tr>
-              <a:tr h="285539">
-                <a:tc>
-                  <a:txBody>
-                    <a:bodyPr/>
-                    <a:lstStyle/>
-                    <a:p>
-                      <a:pPr algn="l" fontAlgn="ctr"/>
-                      <a:r>
-                        <a:rPr lang="en-US" sz="1000" u="none" strike="noStrike">
-                          <a:effectLst/>
-                        </a:rPr>
-                        <a:t>·</a:t>
-                      </a:r>
-                      <a:r>
-                        <a:rPr lang="en-US" sz="700" u="none" strike="noStrike">
-                          <a:effectLst/>
-                        </a:rPr>
-                        <a:t>        </a:t>
-                      </a:r>
-                      <a:r>
-                        <a:rPr lang="en-US" sz="1000" u="none" strike="noStrike">
-                          <a:effectLst/>
-                        </a:rPr>
-                        <a:t>Java Review and Unit Testing in Java (2, 3)</a:t>
-                      </a:r>
-                      <a:endParaRPr lang="en-US" sz="1000" b="0" i="0" u="none" strike="noStrike">
-                        <a:solidFill>
-                          <a:srgbClr val="000000"/>
-                        </a:solidFill>
-                        <a:effectLst/>
-                        <a:latin typeface="Symbol" panose="05050102010706020507" pitchFamily="18" charset="2"/>
-                      </a:endParaRPr>
-                    </a:p>
-                  </a:txBody>
-                  <a:tcPr marL="182880" marR="7620" marT="7620" marB="0" anchor="ctr"/>
-                </a:tc>
-                <a:extLst>
-                  <a:ext uri="{0D108BD9-81ED-4DB2-BD59-A6C34878D82A}">
-                    <a16:rowId xmlns:a16="http://schemas.microsoft.com/office/drawing/2014/main" val="1771452807"/>
-                  </a:ext>
-                </a:extLst>
-              </a:tr>
-              <a:tr h="285539">
-                <a:tc>
-                  <a:txBody>
-                    <a:bodyPr/>
-                    <a:lstStyle/>
-                    <a:p>
-                      <a:pPr algn="l" fontAlgn="ctr"/>
-                      <a:r>
-                        <a:rPr lang="en-US" sz="1000" u="none" strike="noStrike">
-                          <a:effectLst/>
-                        </a:rPr>
-                        <a:t>·</a:t>
-                      </a:r>
-                      <a:r>
-                        <a:rPr lang="en-US" sz="700" u="none" strike="noStrike">
-                          <a:effectLst/>
-                        </a:rPr>
-                        <a:t>        </a:t>
-                      </a:r>
-                      <a:r>
-                        <a:rPr lang="en-US" sz="1000" u="none" strike="noStrike">
-                          <a:effectLst/>
-                        </a:rPr>
-                        <a:t>JS review and JS Unit Testing in (2)</a:t>
-                      </a:r>
-                      <a:endParaRPr lang="en-US" sz="1000" b="0" i="0" u="none" strike="noStrike">
-                        <a:solidFill>
-                          <a:srgbClr val="000000"/>
-                        </a:solidFill>
-                        <a:effectLst/>
-                        <a:latin typeface="Symbol" panose="05050102010706020507" pitchFamily="18" charset="2"/>
-                      </a:endParaRPr>
-                    </a:p>
-                  </a:txBody>
-                  <a:tcPr marL="182880" marR="7620" marT="7620" marB="0" anchor="ctr"/>
-                </a:tc>
-                <a:extLst>
-                  <a:ext uri="{0D108BD9-81ED-4DB2-BD59-A6C34878D82A}">
-                    <a16:rowId xmlns:a16="http://schemas.microsoft.com/office/drawing/2014/main" val="1199781287"/>
-                  </a:ext>
-                </a:extLst>
-              </a:tr>
-              <a:tr h="285539">
-                <a:tc>
-                  <a:txBody>
-                    <a:bodyPr/>
-                    <a:lstStyle/>
-                    <a:p>
-                      <a:pPr algn="l" fontAlgn="ctr"/>
-                      <a:r>
-                        <a:rPr lang="en-US" sz="1000" u="none" strike="noStrike">
-                          <a:effectLst/>
-                        </a:rPr>
-                        <a:t>·</a:t>
-                      </a:r>
-                      <a:r>
-                        <a:rPr lang="en-US" sz="700" u="none" strike="noStrike">
-                          <a:effectLst/>
-                        </a:rPr>
-                        <a:t>        </a:t>
-                      </a:r>
-                      <a:r>
-                        <a:rPr lang="en-US" sz="1000" u="none" strike="noStrike">
-                          <a:effectLst/>
-                        </a:rPr>
-                        <a:t>JS Code Standards (3)</a:t>
-                      </a:r>
-                      <a:endParaRPr lang="en-US" sz="1000" b="0" i="0" u="none" strike="noStrike">
-                        <a:solidFill>
-                          <a:srgbClr val="000000"/>
-                        </a:solidFill>
-                        <a:effectLst/>
-                        <a:latin typeface="Symbol" panose="05050102010706020507" pitchFamily="18" charset="2"/>
-                      </a:endParaRPr>
-                    </a:p>
-                  </a:txBody>
-                  <a:tcPr marL="182880" marR="7620" marT="7620" marB="0" anchor="ctr"/>
-                </a:tc>
-                <a:extLst>
-                  <a:ext uri="{0D108BD9-81ED-4DB2-BD59-A6C34878D82A}">
-                    <a16:rowId xmlns:a16="http://schemas.microsoft.com/office/drawing/2014/main" val="3957372723"/>
-                  </a:ext>
-                </a:extLst>
-              </a:tr>
-              <a:tr h="285539">
-                <a:tc>
-                  <a:txBody>
-                    <a:bodyPr/>
-                    <a:lstStyle/>
-                    <a:p>
-                      <a:pPr algn="l" fontAlgn="ctr"/>
-                      <a:r>
-                        <a:rPr lang="nl-NL" sz="1000" u="none" strike="noStrike">
-                          <a:effectLst/>
-                        </a:rPr>
-                        <a:t>·</a:t>
-                      </a:r>
-                      <a:r>
-                        <a:rPr lang="nl-NL" sz="700" u="none" strike="noStrike">
-                          <a:effectLst/>
-                        </a:rPr>
-                        <a:t>        </a:t>
-                      </a:r>
-                      <a:r>
-                        <a:rPr lang="nl-NL" sz="1000" u="none" strike="noStrike">
-                          <a:effectLst/>
-                        </a:rPr>
-                        <a:t>JS Debugging in JS (2)</a:t>
-                      </a:r>
-                      <a:endParaRPr lang="nl-NL" sz="1000" b="0" i="0" u="none" strike="noStrike">
-                        <a:solidFill>
-                          <a:srgbClr val="000000"/>
-                        </a:solidFill>
-                        <a:effectLst/>
-                        <a:latin typeface="Symbol" panose="05050102010706020507" pitchFamily="18" charset="2"/>
-                      </a:endParaRPr>
-                    </a:p>
-                  </a:txBody>
-                  <a:tcPr marL="182880" marR="7620" marT="7620" marB="0" anchor="ctr"/>
-                </a:tc>
-                <a:extLst>
-                  <a:ext uri="{0D108BD9-81ED-4DB2-BD59-A6C34878D82A}">
-                    <a16:rowId xmlns:a16="http://schemas.microsoft.com/office/drawing/2014/main" val="2169306244"/>
-                  </a:ext>
-                </a:extLst>
-              </a:tr>
-              <a:tr h="264388">
-                <a:tc>
-                  <a:txBody>
-                    <a:bodyPr/>
-                    <a:lstStyle/>
-                    <a:p>
-                      <a:pPr algn="l" fontAlgn="ctr"/>
-                      <a:r>
-                        <a:rPr lang="en-US" sz="1000" u="none" strike="noStrike">
-                          <a:effectLst/>
-                        </a:rPr>
-                        <a:t>·</a:t>
-                      </a:r>
-                      <a:r>
-                        <a:rPr lang="en-US" sz="700" u="none" strike="noStrike">
-                          <a:effectLst/>
-                        </a:rPr>
-                        <a:t>        </a:t>
-                      </a:r>
-                      <a:r>
-                        <a:rPr lang="en-US" sz="1000" u="none" strike="noStrike">
-                          <a:effectLst/>
-                        </a:rPr>
-                        <a:t>Node.js unit testing</a:t>
-                      </a:r>
-                      <a:endParaRPr lang="en-US" sz="1000" b="0" i="0" u="none" strike="noStrike">
-                        <a:solidFill>
-                          <a:srgbClr val="000000"/>
-                        </a:solidFill>
-                        <a:effectLst/>
-                        <a:latin typeface="Symbol" panose="05050102010706020507" pitchFamily="18" charset="2"/>
-                      </a:endParaRPr>
-                    </a:p>
-                  </a:txBody>
-                  <a:tcPr marL="182880" marR="7620" marT="7620" marB="0" anchor="ctr"/>
-                </a:tc>
-                <a:extLst>
-                  <a:ext uri="{0D108BD9-81ED-4DB2-BD59-A6C34878D82A}">
-                    <a16:rowId xmlns:a16="http://schemas.microsoft.com/office/drawing/2014/main" val="649719880"/>
-                  </a:ext>
-                </a:extLst>
-              </a:tr>
-              <a:tr h="264388">
-                <a:tc>
-                  <a:txBody>
-                    <a:bodyPr/>
-                    <a:lstStyle/>
-                    <a:p>
-                      <a:pPr algn="l" fontAlgn="ctr"/>
-                      <a:r>
-                        <a:rPr lang="en-US" sz="1000" u="none" strike="noStrike" dirty="0">
-                          <a:effectLst/>
-                        </a:rPr>
-                        <a:t>·</a:t>
-                      </a:r>
-                      <a:r>
-                        <a:rPr lang="en-US" sz="700" u="none" strike="noStrike" dirty="0">
-                          <a:effectLst/>
-                        </a:rPr>
-                        <a:t>        </a:t>
-                      </a:r>
-                      <a:r>
-                        <a:rPr lang="en-US" sz="1000" u="none" strike="noStrike" dirty="0">
-                          <a:effectLst/>
-                        </a:rPr>
-                        <a:t>API Testing with </a:t>
-                      </a:r>
-                      <a:r>
-                        <a:rPr lang="en-US" sz="1000" u="none" strike="noStrike" dirty="0" err="1">
-                          <a:effectLst/>
-                        </a:rPr>
-                        <a:t>PostMan</a:t>
-                      </a:r>
-                      <a:endParaRPr lang="en-US" sz="1000" b="0" i="0" u="none" strike="noStrike" dirty="0">
-                        <a:solidFill>
-                          <a:srgbClr val="000000"/>
-                        </a:solidFill>
-                        <a:effectLst/>
-                        <a:latin typeface="Symbol" panose="05050102010706020507" pitchFamily="18" charset="2"/>
-                      </a:endParaRPr>
-                    </a:p>
-                  </a:txBody>
-                  <a:tcPr marL="182880" marR="7620" marT="7620" marB="0" anchor="ctr"/>
-                </a:tc>
-                <a:extLst>
-                  <a:ext uri="{0D108BD9-81ED-4DB2-BD59-A6C34878D82A}">
-                    <a16:rowId xmlns:a16="http://schemas.microsoft.com/office/drawing/2014/main" val="730002011"/>
-                  </a:ext>
-                </a:extLst>
-              </a:tr>
-            </a:tbl>
-          </a:graphicData>
-        </a:graphic>
-      </p:graphicFrame>
-      <p:pic>
-        <p:nvPicPr>
-          <p:cNvPr id="6" name="Picture 5">
-            <a:extLst>
-              <a:ext uri="{FF2B5EF4-FFF2-40B4-BE49-F238E27FC236}">
-                <a16:creationId xmlns:a16="http://schemas.microsoft.com/office/drawing/2014/main" id="{0766082F-7C84-4CC2-843A-2D0C851C003C}"/>
+                <a16:creationId xmlns:a16="http://schemas.microsoft.com/office/drawing/2014/main" id="{8A3D3DED-086B-44CB-99B4-BE65E2A12051}"/>
               </a:ext>
             </a:extLst>
           </p:cNvPr>
@@ -12110,14 +11644,742 @@
         </p:blipFill>
         <p:spPr>
           <a:xfrm>
-            <a:off x="1785937" y="576262"/>
-            <a:ext cx="8620125" cy="5705475"/>
+            <a:off x="1943851" y="0"/>
+            <a:ext cx="6333613" cy="6858000"/>
           </a:xfrm>
           <a:prstGeom prst="rect">
             <a:avLst/>
           </a:prstGeom>
         </p:spPr>
       </p:pic>
+      <p:sp>
+        <p:nvSpPr>
+          <p:cNvPr id="2" name="TextBox 1">
+            <a:extLst>
+              <a:ext uri="{FF2B5EF4-FFF2-40B4-BE49-F238E27FC236}">
+                <a16:creationId xmlns:a16="http://schemas.microsoft.com/office/drawing/2014/main" id="{CC9A4175-C16C-4A12-8528-47CB7CD5ADB4}"/>
+              </a:ext>
+            </a:extLst>
+          </p:cNvPr>
+          <p:cNvSpPr txBox="1"/>
+          <p:nvPr/>
+        </p:nvSpPr>
+        <p:spPr>
+          <a:xfrm>
+            <a:off x="9215989" y="713471"/>
+            <a:ext cx="1281376" cy="369332"/>
+          </a:xfrm>
+          <a:prstGeom prst="rect">
+            <a:avLst/>
+          </a:prstGeom>
+          <a:solidFill>
+            <a:schemeClr val="accent6">
+              <a:lumMod val="20000"/>
+              <a:lumOff val="80000"/>
+            </a:schemeClr>
+          </a:solidFill>
+        </p:spPr>
+        <p:txBody>
+          <a:bodyPr wrap="none" rtlCol="0">
+            <a:spAutoFit/>
+          </a:bodyPr>
+          <a:lstStyle/>
+          <a:p>
+            <a:r>
+              <a:rPr lang="en-US" dirty="0"/>
+              <a:t>Teams form</a:t>
+            </a:r>
+          </a:p>
+        </p:txBody>
+      </p:sp>
+      <p:cxnSp>
+        <p:nvCxnSpPr>
+          <p:cNvPr id="5" name="Straight Arrow Connector 4">
+            <a:extLst>
+              <a:ext uri="{FF2B5EF4-FFF2-40B4-BE49-F238E27FC236}">
+                <a16:creationId xmlns:a16="http://schemas.microsoft.com/office/drawing/2014/main" id="{8273C006-C712-418E-B384-8F8227970C70}"/>
+              </a:ext>
+            </a:extLst>
+          </p:cNvPr>
+          <p:cNvCxnSpPr/>
+          <p:nvPr/>
+        </p:nvCxnSpPr>
+        <p:spPr>
+          <a:xfrm flipH="1">
+            <a:off x="6690903" y="1015475"/>
+            <a:ext cx="2583809" cy="381251"/>
+          </a:xfrm>
+          <a:prstGeom prst="straightConnector1">
+            <a:avLst/>
+          </a:prstGeom>
+          <a:ln>
+            <a:tailEnd type="triangle"/>
+          </a:ln>
+        </p:spPr>
+        <p:style>
+          <a:lnRef idx="1">
+            <a:schemeClr val="accent1"/>
+          </a:lnRef>
+          <a:fillRef idx="0">
+            <a:schemeClr val="accent1"/>
+          </a:fillRef>
+          <a:effectRef idx="0">
+            <a:schemeClr val="accent1"/>
+          </a:effectRef>
+          <a:fontRef idx="minor">
+            <a:schemeClr val="tx1"/>
+          </a:fontRef>
+        </p:style>
+      </p:cxnSp>
+      <p:sp>
+        <p:nvSpPr>
+          <p:cNvPr id="7" name="TextBox 6">
+            <a:extLst>
+              <a:ext uri="{FF2B5EF4-FFF2-40B4-BE49-F238E27FC236}">
+                <a16:creationId xmlns:a16="http://schemas.microsoft.com/office/drawing/2014/main" id="{1DF01003-5B93-4C01-BC70-5B16B4BA072C}"/>
+              </a:ext>
+            </a:extLst>
+          </p:cNvPr>
+          <p:cNvSpPr txBox="1"/>
+          <p:nvPr/>
+        </p:nvSpPr>
+        <p:spPr>
+          <a:xfrm>
+            <a:off x="9215989" y="1698730"/>
+            <a:ext cx="2246384" cy="369332"/>
+          </a:xfrm>
+          <a:prstGeom prst="rect">
+            <a:avLst/>
+          </a:prstGeom>
+          <a:solidFill>
+            <a:schemeClr val="accent6">
+              <a:lumMod val="20000"/>
+              <a:lumOff val="80000"/>
+            </a:schemeClr>
+          </a:solidFill>
+        </p:spPr>
+        <p:txBody>
+          <a:bodyPr wrap="none" rtlCol="0">
+            <a:spAutoFit/>
+          </a:bodyPr>
+          <a:lstStyle/>
+          <a:p>
+            <a:r>
+              <a:rPr lang="en-US" dirty="0"/>
+              <a:t>Prototypes developed</a:t>
+            </a:r>
+          </a:p>
+        </p:txBody>
+      </p:sp>
+      <p:cxnSp>
+        <p:nvCxnSpPr>
+          <p:cNvPr id="8" name="Straight Arrow Connector 7">
+            <a:extLst>
+              <a:ext uri="{FF2B5EF4-FFF2-40B4-BE49-F238E27FC236}">
+                <a16:creationId xmlns:a16="http://schemas.microsoft.com/office/drawing/2014/main" id="{971918DD-C558-49C0-912C-269B6AB78257}"/>
+              </a:ext>
+            </a:extLst>
+          </p:cNvPr>
+          <p:cNvCxnSpPr>
+            <a:cxnSpLocks/>
+          </p:cNvCxnSpPr>
+          <p:nvPr/>
+        </p:nvCxnSpPr>
+        <p:spPr>
+          <a:xfrm flipH="1">
+            <a:off x="6678322" y="1797649"/>
+            <a:ext cx="2537668" cy="572417"/>
+          </a:xfrm>
+          <a:prstGeom prst="straightConnector1">
+            <a:avLst/>
+          </a:prstGeom>
+          <a:ln>
+            <a:tailEnd type="triangle"/>
+          </a:ln>
+        </p:spPr>
+        <p:style>
+          <a:lnRef idx="1">
+            <a:schemeClr val="accent1"/>
+          </a:lnRef>
+          <a:fillRef idx="0">
+            <a:schemeClr val="accent1"/>
+          </a:fillRef>
+          <a:effectRef idx="0">
+            <a:schemeClr val="accent1"/>
+          </a:effectRef>
+          <a:fontRef idx="minor">
+            <a:schemeClr val="tx1"/>
+          </a:fontRef>
+        </p:style>
+      </p:cxnSp>
+      <p:sp>
+        <p:nvSpPr>
+          <p:cNvPr id="10" name="TextBox 9">
+            <a:extLst>
+              <a:ext uri="{FF2B5EF4-FFF2-40B4-BE49-F238E27FC236}">
+                <a16:creationId xmlns:a16="http://schemas.microsoft.com/office/drawing/2014/main" id="{5C4A4E3A-03E2-4E0E-BB84-5375B2886CCE}"/>
+              </a:ext>
+            </a:extLst>
+          </p:cNvPr>
+          <p:cNvSpPr txBox="1"/>
+          <p:nvPr/>
+        </p:nvSpPr>
+        <p:spPr>
+          <a:xfrm>
+            <a:off x="9463677" y="2227110"/>
+            <a:ext cx="1362040" cy="369332"/>
+          </a:xfrm>
+          <a:prstGeom prst="rect">
+            <a:avLst/>
+          </a:prstGeom>
+          <a:solidFill>
+            <a:schemeClr val="accent6">
+              <a:lumMod val="20000"/>
+              <a:lumOff val="80000"/>
+            </a:schemeClr>
+          </a:solidFill>
+        </p:spPr>
+        <p:txBody>
+          <a:bodyPr wrap="none" rtlCol="0">
+            <a:spAutoFit/>
+          </a:bodyPr>
+          <a:lstStyle/>
+          <a:p>
+            <a:r>
+              <a:rPr lang="en-US" dirty="0"/>
+              <a:t>Release Plan</a:t>
+            </a:r>
+          </a:p>
+        </p:txBody>
+      </p:sp>
+      <p:cxnSp>
+        <p:nvCxnSpPr>
+          <p:cNvPr id="11" name="Straight Arrow Connector 10">
+            <a:extLst>
+              <a:ext uri="{FF2B5EF4-FFF2-40B4-BE49-F238E27FC236}">
+                <a16:creationId xmlns:a16="http://schemas.microsoft.com/office/drawing/2014/main" id="{73811C20-BACF-4F6F-ADC4-0D59BFBA2972}"/>
+              </a:ext>
+            </a:extLst>
+          </p:cNvPr>
+          <p:cNvCxnSpPr>
+            <a:cxnSpLocks/>
+          </p:cNvCxnSpPr>
+          <p:nvPr/>
+        </p:nvCxnSpPr>
+        <p:spPr>
+          <a:xfrm flipH="1">
+            <a:off x="6870068" y="2326029"/>
+            <a:ext cx="2593610" cy="740838"/>
+          </a:xfrm>
+          <a:prstGeom prst="straightConnector1">
+            <a:avLst/>
+          </a:prstGeom>
+          <a:ln>
+            <a:tailEnd type="triangle"/>
+          </a:ln>
+        </p:spPr>
+        <p:style>
+          <a:lnRef idx="1">
+            <a:schemeClr val="accent1"/>
+          </a:lnRef>
+          <a:fillRef idx="0">
+            <a:schemeClr val="accent1"/>
+          </a:fillRef>
+          <a:effectRef idx="0">
+            <a:schemeClr val="accent1"/>
+          </a:effectRef>
+          <a:fontRef idx="minor">
+            <a:schemeClr val="tx1"/>
+          </a:fontRef>
+        </p:style>
+      </p:cxnSp>
+      <p:sp>
+        <p:nvSpPr>
+          <p:cNvPr id="13" name="TextBox 12">
+            <a:extLst>
+              <a:ext uri="{FF2B5EF4-FFF2-40B4-BE49-F238E27FC236}">
+                <a16:creationId xmlns:a16="http://schemas.microsoft.com/office/drawing/2014/main" id="{3B8E8355-2D91-428F-A544-82494085F6E3}"/>
+              </a:ext>
+            </a:extLst>
+          </p:cNvPr>
+          <p:cNvSpPr txBox="1"/>
+          <p:nvPr/>
+        </p:nvSpPr>
+        <p:spPr>
+          <a:xfrm>
+            <a:off x="9655424" y="3009709"/>
+            <a:ext cx="1362040" cy="369332"/>
+          </a:xfrm>
+          <a:prstGeom prst="rect">
+            <a:avLst/>
+          </a:prstGeom>
+          <a:solidFill>
+            <a:schemeClr val="accent6">
+              <a:lumMod val="20000"/>
+              <a:lumOff val="80000"/>
+            </a:schemeClr>
+          </a:solidFill>
+        </p:spPr>
+        <p:txBody>
+          <a:bodyPr wrap="square" rtlCol="0">
+            <a:spAutoFit/>
+          </a:bodyPr>
+          <a:lstStyle/>
+          <a:p>
+            <a:r>
+              <a:rPr lang="en-US" dirty="0"/>
+              <a:t>Sprints Start</a:t>
+            </a:r>
+          </a:p>
+        </p:txBody>
+      </p:sp>
+      <p:cxnSp>
+        <p:nvCxnSpPr>
+          <p:cNvPr id="14" name="Straight Arrow Connector 13">
+            <a:extLst>
+              <a:ext uri="{FF2B5EF4-FFF2-40B4-BE49-F238E27FC236}">
+                <a16:creationId xmlns:a16="http://schemas.microsoft.com/office/drawing/2014/main" id="{8390EDE9-5AE1-4E50-AD11-1BEEFF8BCC8B}"/>
+              </a:ext>
+            </a:extLst>
+          </p:cNvPr>
+          <p:cNvCxnSpPr>
+            <a:cxnSpLocks/>
+          </p:cNvCxnSpPr>
+          <p:nvPr/>
+        </p:nvCxnSpPr>
+        <p:spPr>
+          <a:xfrm flipH="1">
+            <a:off x="7061815" y="3108628"/>
+            <a:ext cx="2593610" cy="345836"/>
+          </a:xfrm>
+          <a:prstGeom prst="straightConnector1">
+            <a:avLst/>
+          </a:prstGeom>
+          <a:ln>
+            <a:tailEnd type="triangle"/>
+          </a:ln>
+        </p:spPr>
+        <p:style>
+          <a:lnRef idx="1">
+            <a:schemeClr val="accent1"/>
+          </a:lnRef>
+          <a:fillRef idx="0">
+            <a:schemeClr val="accent1"/>
+          </a:fillRef>
+          <a:effectRef idx="0">
+            <a:schemeClr val="accent1"/>
+          </a:effectRef>
+          <a:fontRef idx="minor">
+            <a:schemeClr val="tx1"/>
+          </a:fontRef>
+        </p:style>
+      </p:cxnSp>
+      <p:sp>
+        <p:nvSpPr>
+          <p:cNvPr id="20" name="TextBox 19">
+            <a:extLst>
+              <a:ext uri="{FF2B5EF4-FFF2-40B4-BE49-F238E27FC236}">
+                <a16:creationId xmlns:a16="http://schemas.microsoft.com/office/drawing/2014/main" id="{628EC2CF-970F-437D-A033-8CDFBD05FAD9}"/>
+              </a:ext>
+            </a:extLst>
+          </p:cNvPr>
+          <p:cNvSpPr txBox="1"/>
+          <p:nvPr/>
+        </p:nvSpPr>
+        <p:spPr>
+          <a:xfrm>
+            <a:off x="9135325" y="5842525"/>
+            <a:ext cx="1690392" cy="646331"/>
+          </a:xfrm>
+          <a:prstGeom prst="rect">
+            <a:avLst/>
+          </a:prstGeom>
+          <a:solidFill>
+            <a:schemeClr val="accent6">
+              <a:lumMod val="20000"/>
+              <a:lumOff val="80000"/>
+            </a:schemeClr>
+          </a:solidFill>
+        </p:spPr>
+        <p:txBody>
+          <a:bodyPr wrap="square" rtlCol="0">
+            <a:spAutoFit/>
+          </a:bodyPr>
+          <a:lstStyle/>
+          <a:p>
+            <a:r>
+              <a:rPr lang="en-US" dirty="0"/>
+              <a:t>Final Presentations</a:t>
+            </a:r>
+          </a:p>
+        </p:txBody>
+      </p:sp>
+      <p:cxnSp>
+        <p:nvCxnSpPr>
+          <p:cNvPr id="21" name="Straight Arrow Connector 20">
+            <a:extLst>
+              <a:ext uri="{FF2B5EF4-FFF2-40B4-BE49-F238E27FC236}">
+                <a16:creationId xmlns:a16="http://schemas.microsoft.com/office/drawing/2014/main" id="{9BC70191-D5F6-4D32-AE5D-1F1B5B749B04}"/>
+              </a:ext>
+            </a:extLst>
+          </p:cNvPr>
+          <p:cNvCxnSpPr>
+            <a:cxnSpLocks/>
+          </p:cNvCxnSpPr>
+          <p:nvPr/>
+        </p:nvCxnSpPr>
+        <p:spPr>
+          <a:xfrm flipH="1">
+            <a:off x="6541716" y="5941444"/>
+            <a:ext cx="2593610" cy="345836"/>
+          </a:xfrm>
+          <a:prstGeom prst="straightConnector1">
+            <a:avLst/>
+          </a:prstGeom>
+          <a:ln>
+            <a:tailEnd type="triangle"/>
+          </a:ln>
+        </p:spPr>
+        <p:style>
+          <a:lnRef idx="1">
+            <a:schemeClr val="accent1"/>
+          </a:lnRef>
+          <a:fillRef idx="0">
+            <a:schemeClr val="accent1"/>
+          </a:fillRef>
+          <a:effectRef idx="0">
+            <a:schemeClr val="accent1"/>
+          </a:effectRef>
+          <a:fontRef idx="minor">
+            <a:schemeClr val="tx1"/>
+          </a:fontRef>
+        </p:style>
+      </p:cxnSp>
+      <p:sp>
+        <p:nvSpPr>
+          <p:cNvPr id="22" name="TextBox 21">
+            <a:extLst>
+              <a:ext uri="{FF2B5EF4-FFF2-40B4-BE49-F238E27FC236}">
+                <a16:creationId xmlns:a16="http://schemas.microsoft.com/office/drawing/2014/main" id="{2FAC74A4-C5B1-44A2-BA70-6CDDA940A45A}"/>
+              </a:ext>
+            </a:extLst>
+          </p:cNvPr>
+          <p:cNvSpPr txBox="1"/>
+          <p:nvPr/>
+        </p:nvSpPr>
+        <p:spPr>
+          <a:xfrm>
+            <a:off x="9567129" y="3802844"/>
+            <a:ext cx="1362040" cy="369332"/>
+          </a:xfrm>
+          <a:prstGeom prst="rect">
+            <a:avLst/>
+          </a:prstGeom>
+          <a:solidFill>
+            <a:schemeClr val="accent6">
+              <a:lumMod val="20000"/>
+              <a:lumOff val="80000"/>
+            </a:schemeClr>
+          </a:solidFill>
+        </p:spPr>
+        <p:txBody>
+          <a:bodyPr wrap="square" rtlCol="0">
+            <a:spAutoFit/>
+          </a:bodyPr>
+          <a:lstStyle/>
+          <a:p>
+            <a:r>
+              <a:rPr lang="en-US" dirty="0"/>
+              <a:t>Status 1 </a:t>
+            </a:r>
+          </a:p>
+        </p:txBody>
+      </p:sp>
+      <p:sp>
+        <p:nvSpPr>
+          <p:cNvPr id="23" name="TextBox 22">
+            <a:extLst>
+              <a:ext uri="{FF2B5EF4-FFF2-40B4-BE49-F238E27FC236}">
+                <a16:creationId xmlns:a16="http://schemas.microsoft.com/office/drawing/2014/main" id="{C8ADBD13-8546-40CE-B0F2-0FF0F953A421}"/>
+              </a:ext>
+            </a:extLst>
+          </p:cNvPr>
+          <p:cNvSpPr txBox="1"/>
+          <p:nvPr/>
+        </p:nvSpPr>
+        <p:spPr>
+          <a:xfrm>
+            <a:off x="9630811" y="4437865"/>
+            <a:ext cx="1362040" cy="369332"/>
+          </a:xfrm>
+          <a:prstGeom prst="rect">
+            <a:avLst/>
+          </a:prstGeom>
+          <a:solidFill>
+            <a:schemeClr val="accent6">
+              <a:lumMod val="20000"/>
+              <a:lumOff val="80000"/>
+            </a:schemeClr>
+          </a:solidFill>
+        </p:spPr>
+        <p:txBody>
+          <a:bodyPr wrap="square" rtlCol="0">
+            <a:spAutoFit/>
+          </a:bodyPr>
+          <a:lstStyle/>
+          <a:p>
+            <a:r>
+              <a:rPr lang="en-US" dirty="0"/>
+              <a:t>Status 2 </a:t>
+            </a:r>
+          </a:p>
+        </p:txBody>
+      </p:sp>
+      <p:cxnSp>
+        <p:nvCxnSpPr>
+          <p:cNvPr id="24" name="Straight Arrow Connector 23">
+            <a:extLst>
+              <a:ext uri="{FF2B5EF4-FFF2-40B4-BE49-F238E27FC236}">
+                <a16:creationId xmlns:a16="http://schemas.microsoft.com/office/drawing/2014/main" id="{45F91292-B57E-41BF-9190-E05DAD39C881}"/>
+              </a:ext>
+            </a:extLst>
+          </p:cNvPr>
+          <p:cNvCxnSpPr>
+            <a:cxnSpLocks/>
+          </p:cNvCxnSpPr>
+          <p:nvPr/>
+        </p:nvCxnSpPr>
+        <p:spPr>
+          <a:xfrm flipH="1">
+            <a:off x="7037201" y="4010903"/>
+            <a:ext cx="2593610" cy="345836"/>
+          </a:xfrm>
+          <a:prstGeom prst="straightConnector1">
+            <a:avLst/>
+          </a:prstGeom>
+          <a:ln>
+            <a:tailEnd type="triangle"/>
+          </a:ln>
+        </p:spPr>
+        <p:style>
+          <a:lnRef idx="1">
+            <a:schemeClr val="accent1"/>
+          </a:lnRef>
+          <a:fillRef idx="0">
+            <a:schemeClr val="accent1"/>
+          </a:fillRef>
+          <a:effectRef idx="0">
+            <a:schemeClr val="accent1"/>
+          </a:effectRef>
+          <a:fontRef idx="minor">
+            <a:schemeClr val="tx1"/>
+          </a:fontRef>
+        </p:style>
+      </p:cxnSp>
+      <p:cxnSp>
+        <p:nvCxnSpPr>
+          <p:cNvPr id="25" name="Straight Arrow Connector 24">
+            <a:extLst>
+              <a:ext uri="{FF2B5EF4-FFF2-40B4-BE49-F238E27FC236}">
+                <a16:creationId xmlns:a16="http://schemas.microsoft.com/office/drawing/2014/main" id="{2BDC1937-3BAB-4D48-9298-F410692C2DB0}"/>
+              </a:ext>
+            </a:extLst>
+          </p:cNvPr>
+          <p:cNvCxnSpPr>
+            <a:cxnSpLocks/>
+          </p:cNvCxnSpPr>
+          <p:nvPr/>
+        </p:nvCxnSpPr>
+        <p:spPr>
+          <a:xfrm flipH="1">
+            <a:off x="7061815" y="4601551"/>
+            <a:ext cx="2593610" cy="345836"/>
+          </a:xfrm>
+          <a:prstGeom prst="straightConnector1">
+            <a:avLst/>
+          </a:prstGeom>
+          <a:ln>
+            <a:tailEnd type="triangle"/>
+          </a:ln>
+        </p:spPr>
+        <p:style>
+          <a:lnRef idx="1">
+            <a:schemeClr val="accent1"/>
+          </a:lnRef>
+          <a:fillRef idx="0">
+            <a:schemeClr val="accent1"/>
+          </a:fillRef>
+          <a:effectRef idx="0">
+            <a:schemeClr val="accent1"/>
+          </a:effectRef>
+          <a:fontRef idx="minor">
+            <a:schemeClr val="tx1"/>
+          </a:fontRef>
+        </p:style>
+      </p:cxnSp>
+      <p:sp>
+        <p:nvSpPr>
+          <p:cNvPr id="26" name="TextBox 25">
+            <a:extLst>
+              <a:ext uri="{FF2B5EF4-FFF2-40B4-BE49-F238E27FC236}">
+                <a16:creationId xmlns:a16="http://schemas.microsoft.com/office/drawing/2014/main" id="{90561B65-7E71-4CA7-B620-DD8E821EC40F}"/>
+              </a:ext>
+            </a:extLst>
+          </p:cNvPr>
+          <p:cNvSpPr txBox="1"/>
+          <p:nvPr/>
+        </p:nvSpPr>
+        <p:spPr>
+          <a:xfrm>
+            <a:off x="9613499" y="4906825"/>
+            <a:ext cx="1362040" cy="369332"/>
+          </a:xfrm>
+          <a:prstGeom prst="rect">
+            <a:avLst/>
+          </a:prstGeom>
+          <a:solidFill>
+            <a:schemeClr val="accent6">
+              <a:lumMod val="20000"/>
+              <a:lumOff val="80000"/>
+            </a:schemeClr>
+          </a:solidFill>
+        </p:spPr>
+        <p:txBody>
+          <a:bodyPr wrap="square" rtlCol="0">
+            <a:spAutoFit/>
+          </a:bodyPr>
+          <a:lstStyle/>
+          <a:p>
+            <a:r>
+              <a:rPr lang="en-US" dirty="0"/>
+              <a:t>Status 3 </a:t>
+            </a:r>
+          </a:p>
+        </p:txBody>
+      </p:sp>
+      <p:cxnSp>
+        <p:nvCxnSpPr>
+          <p:cNvPr id="27" name="Straight Arrow Connector 26">
+            <a:extLst>
+              <a:ext uri="{FF2B5EF4-FFF2-40B4-BE49-F238E27FC236}">
+                <a16:creationId xmlns:a16="http://schemas.microsoft.com/office/drawing/2014/main" id="{97D6DEB3-0A67-4C42-A4FE-ACA4ECF00D25}"/>
+              </a:ext>
+            </a:extLst>
+          </p:cNvPr>
+          <p:cNvCxnSpPr>
+            <a:cxnSpLocks/>
+            <a:stCxn id="26" idx="1"/>
+          </p:cNvCxnSpPr>
+          <p:nvPr/>
+        </p:nvCxnSpPr>
+        <p:spPr>
+          <a:xfrm flipH="1">
+            <a:off x="7196461" y="5091491"/>
+            <a:ext cx="2417038" cy="385652"/>
+          </a:xfrm>
+          <a:prstGeom prst="straightConnector1">
+            <a:avLst/>
+          </a:prstGeom>
+          <a:ln>
+            <a:tailEnd type="triangle"/>
+          </a:ln>
+        </p:spPr>
+        <p:style>
+          <a:lnRef idx="1">
+            <a:schemeClr val="accent1"/>
+          </a:lnRef>
+          <a:fillRef idx="0">
+            <a:schemeClr val="accent1"/>
+          </a:fillRef>
+          <a:effectRef idx="0">
+            <a:schemeClr val="accent1"/>
+          </a:effectRef>
+          <a:fontRef idx="minor">
+            <a:schemeClr val="tx1"/>
+          </a:fontRef>
+        </p:style>
+      </p:cxnSp>
+      <p:sp>
+        <p:nvSpPr>
+          <p:cNvPr id="29" name="TextBox 28">
+            <a:extLst>
+              <a:ext uri="{FF2B5EF4-FFF2-40B4-BE49-F238E27FC236}">
+                <a16:creationId xmlns:a16="http://schemas.microsoft.com/office/drawing/2014/main" id="{17AFE462-662D-4D4A-A0EF-DE381959ACCF}"/>
+              </a:ext>
+            </a:extLst>
+          </p:cNvPr>
+          <p:cNvSpPr txBox="1"/>
+          <p:nvPr/>
+        </p:nvSpPr>
+        <p:spPr>
+          <a:xfrm>
+            <a:off x="9654964" y="5329089"/>
+            <a:ext cx="1362040" cy="369332"/>
+          </a:xfrm>
+          <a:prstGeom prst="rect">
+            <a:avLst/>
+          </a:prstGeom>
+          <a:solidFill>
+            <a:schemeClr val="accent6">
+              <a:lumMod val="20000"/>
+              <a:lumOff val="80000"/>
+            </a:schemeClr>
+          </a:solidFill>
+        </p:spPr>
+        <p:txBody>
+          <a:bodyPr wrap="square" rtlCol="0">
+            <a:spAutoFit/>
+          </a:bodyPr>
+          <a:lstStyle/>
+          <a:p>
+            <a:r>
+              <a:rPr lang="en-US" dirty="0"/>
+              <a:t>Team Evals</a:t>
+            </a:r>
+          </a:p>
+        </p:txBody>
+      </p:sp>
+      <p:cxnSp>
+        <p:nvCxnSpPr>
+          <p:cNvPr id="30" name="Straight Arrow Connector 29">
+            <a:extLst>
+              <a:ext uri="{FF2B5EF4-FFF2-40B4-BE49-F238E27FC236}">
+                <a16:creationId xmlns:a16="http://schemas.microsoft.com/office/drawing/2014/main" id="{85324C7D-60CC-4E77-AF92-BA0E7331D22E}"/>
+              </a:ext>
+            </a:extLst>
+          </p:cNvPr>
+          <p:cNvCxnSpPr>
+            <a:cxnSpLocks/>
+          </p:cNvCxnSpPr>
+          <p:nvPr/>
+        </p:nvCxnSpPr>
+        <p:spPr>
+          <a:xfrm flipH="1">
+            <a:off x="7238056" y="5505595"/>
+            <a:ext cx="2417038" cy="385652"/>
+          </a:xfrm>
+          <a:prstGeom prst="straightConnector1">
+            <a:avLst/>
+          </a:prstGeom>
+          <a:ln>
+            <a:tailEnd type="triangle"/>
+          </a:ln>
+        </p:spPr>
+        <p:style>
+          <a:lnRef idx="1">
+            <a:schemeClr val="accent1"/>
+          </a:lnRef>
+          <a:fillRef idx="0">
+            <a:schemeClr val="accent1"/>
+          </a:fillRef>
+          <a:effectRef idx="0">
+            <a:schemeClr val="accent1"/>
+          </a:effectRef>
+          <a:fontRef idx="minor">
+            <a:schemeClr val="tx1"/>
+          </a:fontRef>
+        </p:style>
+      </p:cxnSp>
     </p:spTree>
     <p:extLst>
       <p:ext uri="{BB962C8B-B14F-4D97-AF65-F5344CB8AC3E}">

</xml_diff>